<commit_message>
worked on actuarial value and member months powerpoints
</commit_message>
<xml_diff>
--- a/PowerPoints/Phase 4 - Insurance Terminology/020 Different Types of Commercial Insurance.pptx
+++ b/PowerPoints/Phase 4 - Insurance Terminology/020 Different Types of Commercial Insurance.pptx
@@ -1679,7 +1679,7 @@
   </p:clrMapOvr>
   <p:extLst>
     <p:ext uri="{DCECCB84-F9BA-43D5-87BE-67443E8EF086}">
-      <p15:sldGuideLst xmlns="" xmlns:p15="http://schemas.microsoft.com/office/powerpoint/2012/main"/>
+      <p15:sldGuideLst xmlns:p15="http://schemas.microsoft.com/office/powerpoint/2012/main" xmlns=""/>
     </p:ext>
   </p:extLst>
 </p:sldLayout>
@@ -2106,7 +2106,7 @@
   </p:clrMapOvr>
   <p:extLst>
     <p:ext uri="{DCECCB84-F9BA-43D5-87BE-67443E8EF086}">
-      <p15:sldGuideLst xmlns="" xmlns:p15="http://schemas.microsoft.com/office/powerpoint/2012/main"/>
+      <p15:sldGuideLst xmlns:p15="http://schemas.microsoft.com/office/powerpoint/2012/main" xmlns=""/>
     </p:ext>
   </p:extLst>
 </p:sldLayout>
@@ -2649,7 +2649,7 @@
   </p:clrMapOvr>
   <p:extLst>
     <p:ext uri="{DCECCB84-F9BA-43D5-87BE-67443E8EF086}">
-      <p15:sldGuideLst xmlns="" xmlns:p15="http://schemas.microsoft.com/office/powerpoint/2012/main"/>
+      <p15:sldGuideLst xmlns:p15="http://schemas.microsoft.com/office/powerpoint/2012/main" xmlns=""/>
     </p:ext>
   </p:extLst>
 </p:sldLayout>
@@ -4195,7 +4195,7 @@
   </p:clrMapOvr>
   <p:extLst>
     <p:ext uri="{DCECCB84-F9BA-43D5-87BE-67443E8EF086}">
-      <p15:sldGuideLst xmlns="" xmlns:p15="http://schemas.microsoft.com/office/powerpoint/2012/main"/>
+      <p15:sldGuideLst xmlns:p15="http://schemas.microsoft.com/office/powerpoint/2012/main" xmlns=""/>
     </p:ext>
   </p:extLst>
 </p:sldLayout>
@@ -4570,7 +4570,7 @@
   </p:clrMapOvr>
   <p:extLst>
     <p:ext uri="{DCECCB84-F9BA-43D5-87BE-67443E8EF086}">
-      <p15:sldGuideLst xmlns="" xmlns:p15="http://schemas.microsoft.com/office/powerpoint/2012/main"/>
+      <p15:sldGuideLst xmlns:p15="http://schemas.microsoft.com/office/powerpoint/2012/main" xmlns=""/>
     </p:ext>
   </p:extLst>
 </p:sldLayout>
@@ -5072,7 +5072,7 @@
   </p:clrMapOvr>
   <p:extLst>
     <p:ext uri="{DCECCB84-F9BA-43D5-87BE-67443E8EF086}">
-      <p15:sldGuideLst xmlns="" xmlns:p15="http://schemas.microsoft.com/office/powerpoint/2012/main"/>
+      <p15:sldGuideLst xmlns:p15="http://schemas.microsoft.com/office/powerpoint/2012/main" xmlns=""/>
     </p:ext>
   </p:extLst>
 </p:sldLayout>
@@ -5871,7 +5871,7 @@
   </p:txStyles>
   <p:extLst>
     <p:ext uri="{27BBF7A9-308A-43DC-89C8-2F10F3537804}">
-      <p15:sldGuideLst xmlns="" xmlns:p15="http://schemas.microsoft.com/office/powerpoint/2012/main"/>
+      <p15:sldGuideLst xmlns:p15="http://schemas.microsoft.com/office/powerpoint/2012/main" xmlns=""/>
     </p:ext>
   </p:extLst>
 </p:sldMaster>
@@ -6568,7 +6568,7 @@
   </p:txStyles>
   <p:extLst>
     <p:ext uri="{27BBF7A9-308A-43DC-89C8-2F10F3537804}">
-      <p15:sldGuideLst xmlns="" xmlns:p15="http://schemas.microsoft.com/office/powerpoint/2012/main"/>
+      <p15:sldGuideLst xmlns:p15="http://schemas.microsoft.com/office/powerpoint/2012/main" xmlns=""/>
     </p:ext>
   </p:extLst>
 </p:sldMaster>
@@ -6603,12 +6603,26 @@
         </p:nvSpPr>
         <p:spPr/>
         <p:txBody>
-          <a:bodyPr/>
+          <a:bodyPr>
+            <a:normAutofit/>
+          </a:bodyPr>
           <a:lstStyle/>
           <a:p>
             <a:r>
               <a:rPr lang="en-US" dirty="0" smtClean="0"/>
-              <a:t>Types of Health Insurance</a:t>
+              <a:t>Types of </a:t>
+            </a:r>
+            <a:r>
+              <a:rPr lang="en-US" dirty="0" err="1" smtClean="0"/>
+              <a:t>Commerical</a:t>
+            </a:r>
+            <a:r>
+              <a:rPr lang="en-US" smtClean="0"/>
+              <a:t> Health </a:t>
+            </a:r>
+            <a:r>
+              <a:rPr lang="en-US" dirty="0" smtClean="0"/>
+              <a:t>Insurance</a:t>
             </a:r>
             <a:endParaRPr lang="en-US" dirty="0"/>
           </a:p>
@@ -7574,7 +7588,7 @@
   <a:extraClrSchemeLst/>
   <a:extLst>
     <a:ext uri="{05A4C25C-085E-4340-85A3-A5531E510DB2}">
-      <thm15:themeFamily xmlns="" xmlns:thm15="http://schemas.microsoft.com/office/thememl/2012/main" name="Gallery" id="{BBFCD31E-59A1-489D-B089-A3EAD7CAE12E}" vid="{AC464412-510E-4F2B-8947-A0DDBD028997}"/>
+      <thm15:themeFamily xmlns:thm15="http://schemas.microsoft.com/office/thememl/2012/main" xmlns="" name="Gallery" id="{BBFCD31E-59A1-489D-B089-A3EAD7CAE12E}" vid="{AC464412-510E-4F2B-8947-A0DDBD028997}"/>
     </a:ext>
   </a:extLst>
 </a:theme>

</xml_diff>

<commit_message>
completed the commericial insurnace powerpoint
</commit_message>
<xml_diff>
--- a/PowerPoints/Phase 4 - Insurance Terminology/020 Different Types of Commercial Insurance.pptx
+++ b/PowerPoints/Phase 4 - Insurance Terminology/020 Different Types of Commercial Insurance.pptx
@@ -7,12 +7,11 @@
   </p:sldMasterIdLst>
   <p:sldIdLst>
     <p:sldId id="256" r:id="rId3"/>
-    <p:sldId id="257" r:id="rId4"/>
-    <p:sldId id="258" r:id="rId5"/>
-    <p:sldId id="259" r:id="rId6"/>
+    <p:sldId id="259" r:id="rId4"/>
+    <p:sldId id="257" r:id="rId5"/>
+    <p:sldId id="258" r:id="rId6"/>
     <p:sldId id="260" r:id="rId7"/>
-    <p:sldId id="261" r:id="rId8"/>
-    <p:sldId id="262" r:id="rId9"/>
+    <p:sldId id="262" r:id="rId8"/>
   </p:sldIdLst>
   <p:sldSz cx="12192000" cy="6858000"/>
   <p:notesSz cx="6858000" cy="9144000"/>
@@ -1679,7 +1678,7 @@
   </p:clrMapOvr>
   <p:extLst>
     <p:ext uri="{DCECCB84-F9BA-43D5-87BE-67443E8EF086}">
-      <p15:sldGuideLst xmlns:p15="http://schemas.microsoft.com/office/powerpoint/2012/main" xmlns=""/>
+      <p15:sldGuideLst xmlns="" xmlns:p15="http://schemas.microsoft.com/office/powerpoint/2012/main"/>
     </p:ext>
   </p:extLst>
 </p:sldLayout>
@@ -2106,7 +2105,7 @@
   </p:clrMapOvr>
   <p:extLst>
     <p:ext uri="{DCECCB84-F9BA-43D5-87BE-67443E8EF086}">
-      <p15:sldGuideLst xmlns:p15="http://schemas.microsoft.com/office/powerpoint/2012/main" xmlns=""/>
+      <p15:sldGuideLst xmlns="" xmlns:p15="http://schemas.microsoft.com/office/powerpoint/2012/main"/>
     </p:ext>
   </p:extLst>
 </p:sldLayout>
@@ -2649,7 +2648,7 @@
   </p:clrMapOvr>
   <p:extLst>
     <p:ext uri="{DCECCB84-F9BA-43D5-87BE-67443E8EF086}">
-      <p15:sldGuideLst xmlns:p15="http://schemas.microsoft.com/office/powerpoint/2012/main" xmlns=""/>
+      <p15:sldGuideLst xmlns="" xmlns:p15="http://schemas.microsoft.com/office/powerpoint/2012/main"/>
     </p:ext>
   </p:extLst>
 </p:sldLayout>
@@ -4195,7 +4194,7 @@
   </p:clrMapOvr>
   <p:extLst>
     <p:ext uri="{DCECCB84-F9BA-43D5-87BE-67443E8EF086}">
-      <p15:sldGuideLst xmlns:p15="http://schemas.microsoft.com/office/powerpoint/2012/main" xmlns=""/>
+      <p15:sldGuideLst xmlns="" xmlns:p15="http://schemas.microsoft.com/office/powerpoint/2012/main"/>
     </p:ext>
   </p:extLst>
 </p:sldLayout>
@@ -4570,7 +4569,7 @@
   </p:clrMapOvr>
   <p:extLst>
     <p:ext uri="{DCECCB84-F9BA-43D5-87BE-67443E8EF086}">
-      <p15:sldGuideLst xmlns:p15="http://schemas.microsoft.com/office/powerpoint/2012/main" xmlns=""/>
+      <p15:sldGuideLst xmlns="" xmlns:p15="http://schemas.microsoft.com/office/powerpoint/2012/main"/>
     </p:ext>
   </p:extLst>
 </p:sldLayout>
@@ -5072,7 +5071,7 @@
   </p:clrMapOvr>
   <p:extLst>
     <p:ext uri="{DCECCB84-F9BA-43D5-87BE-67443E8EF086}">
-      <p15:sldGuideLst xmlns:p15="http://schemas.microsoft.com/office/powerpoint/2012/main" xmlns=""/>
+      <p15:sldGuideLst xmlns="" xmlns:p15="http://schemas.microsoft.com/office/powerpoint/2012/main"/>
     </p:ext>
   </p:extLst>
 </p:sldLayout>
@@ -5871,7 +5870,7 @@
   </p:txStyles>
   <p:extLst>
     <p:ext uri="{27BBF7A9-308A-43DC-89C8-2F10F3537804}">
-      <p15:sldGuideLst xmlns:p15="http://schemas.microsoft.com/office/powerpoint/2012/main" xmlns=""/>
+      <p15:sldGuideLst xmlns="" xmlns:p15="http://schemas.microsoft.com/office/powerpoint/2012/main"/>
     </p:ext>
   </p:extLst>
 </p:sldMaster>
@@ -6568,7 +6567,7 @@
   </p:txStyles>
   <p:extLst>
     <p:ext uri="{27BBF7A9-308A-43DC-89C8-2F10F3537804}">
-      <p15:sldGuideLst xmlns:p15="http://schemas.microsoft.com/office/powerpoint/2012/main" xmlns=""/>
+      <p15:sldGuideLst xmlns="" xmlns:p15="http://schemas.microsoft.com/office/powerpoint/2012/main"/>
     </p:ext>
   </p:extLst>
 </p:sldMaster>
@@ -6698,7 +6697,7 @@
           <a:p>
             <a:r>
               <a:rPr lang="en-US" dirty="0" smtClean="0"/>
-              <a:t>Self-Insured vs. Fully Insured</a:t>
+              <a:t>Types of Coverage	</a:t>
             </a:r>
             <a:endParaRPr lang="en-US" dirty="0"/>
           </a:p>
@@ -6719,14 +6718,48 @@
           <a:bodyPr/>
           <a:lstStyle/>
           <a:p>
-            <a:endParaRPr lang="en-US" dirty="0"/>
+            <a:r>
+              <a:rPr lang="en-US" dirty="0" smtClean="0"/>
+              <a:t>Health Maintenance Organization (HMO)</a:t>
+            </a:r>
+          </a:p>
+          <a:p>
+            <a:r>
+              <a:rPr lang="en-US" dirty="0" smtClean="0"/>
+              <a:t>Exclusive Provider Organization (EPO)</a:t>
+            </a:r>
+          </a:p>
+          <a:p>
+            <a:r>
+              <a:rPr lang="en-US" dirty="0" smtClean="0"/>
+              <a:t>Preferred Provider Organization (PPO)</a:t>
+            </a:r>
+          </a:p>
+          <a:p>
+            <a:r>
+              <a:rPr lang="en-US" dirty="0" smtClean="0"/>
+              <a:t>Point of Service (POS)</a:t>
+            </a:r>
+          </a:p>
+          <a:p>
+            <a:r>
+              <a:rPr lang="en-US" dirty="0" smtClean="0"/>
+              <a:t>Indemnity Insurance</a:t>
+            </a:r>
+          </a:p>
+          <a:p>
+            <a:r>
+              <a:rPr lang="en-US" dirty="0" smtClean="0"/>
+              <a:t>Worker’s Compensation</a:t>
+            </a:r>
+            <a:endParaRPr lang="en-US" dirty="0" smtClean="0"/>
           </a:p>
         </p:txBody>
       </p:sp>
     </p:spTree>
     <p:extLst>
       <p:ext uri="{BB962C8B-B14F-4D97-AF65-F5344CB8AC3E}">
-        <p14:creationId xmlns:p14="http://schemas.microsoft.com/office/powerpoint/2010/main" val="3205627481"/>
+        <p14:creationId xmlns:p14="http://schemas.microsoft.com/office/powerpoint/2010/main" val="1243835761"/>
       </p:ext>
     </p:extLst>
   </p:cSld>
@@ -6770,7 +6803,7 @@
           <a:p>
             <a:r>
               <a:rPr lang="en-US" dirty="0" smtClean="0"/>
-              <a:t>Primary Coverage vs. Secondary Coverage</a:t>
+              <a:t>Self-Insured vs. Fully Insured</a:t>
             </a:r>
             <a:endParaRPr lang="en-US" dirty="0"/>
           </a:p>
@@ -6791,6 +6824,22 @@
           <a:bodyPr/>
           <a:lstStyle/>
           <a:p>
+            <a:r>
+              <a:rPr lang="en-US" dirty="0" smtClean="0"/>
+              <a:t>Fully-insured:  The insurance organization is paid a premium, and becomes responsible for paying all claims under that policy.</a:t>
+            </a:r>
+          </a:p>
+          <a:p>
+            <a:r>
+              <a:rPr lang="en-US" dirty="0" smtClean="0"/>
+              <a:t>Self-insured:  Also know as Administrative-Services Only (ASO).  The insurance organization receives a fee to act as a third-party administrator.  All claims are paid by the insured.  The insurance company facilitates payment from the insured to the providers.  </a:t>
+            </a:r>
+          </a:p>
+          <a:p>
+            <a:r>
+              <a:rPr lang="en-US" dirty="0" smtClean="0"/>
+              <a:t>APCD Coverage Type Codes: ASO with Reinsurance, ASO without Reinsurance, Fully-insured policies underwritten by the insurer.</a:t>
+            </a:r>
             <a:endParaRPr lang="en-US" dirty="0"/>
           </a:p>
         </p:txBody>
@@ -6798,7 +6847,7 @@
     </p:spTree>
     <p:extLst>
       <p:ext uri="{BB962C8B-B14F-4D97-AF65-F5344CB8AC3E}">
-        <p14:creationId xmlns:p14="http://schemas.microsoft.com/office/powerpoint/2010/main" val="1243835761"/>
+        <p14:creationId xmlns:p14="http://schemas.microsoft.com/office/powerpoint/2010/main" val="3205627481"/>
       </p:ext>
     </p:extLst>
   </p:cSld>
@@ -6842,13 +6891,9 @@
           <a:p>
             <a:r>
               <a:rPr lang="en-US" dirty="0" smtClean="0"/>
-              <a:t>Types </a:t>
-            </a:r>
-            <a:r>
-              <a:rPr lang="en-US" smtClean="0"/>
-              <a:t>of Coverage	ME003</a:t>
-            </a:r>
-            <a:endParaRPr lang="en-US"/>
+              <a:t>Primary Coverage vs. Secondary Coverage</a:t>
+            </a:r>
+            <a:endParaRPr lang="en-US" dirty="0"/>
           </a:p>
         </p:txBody>
       </p:sp>
@@ -6862,10 +6907,66 @@
             <p:ph idx="1"/>
           </p:nvPr>
         </p:nvSpPr>
-        <p:spPr/>
-        <p:txBody>
-          <a:bodyPr/>
-          <a:lstStyle/>
+        <p:spPr>
+          <a:xfrm>
+            <a:off x="1534696" y="2015732"/>
+            <a:ext cx="9520158" cy="3963828"/>
+          </a:xfrm>
+        </p:spPr>
+        <p:txBody>
+          <a:bodyPr>
+            <a:normAutofit/>
+          </a:bodyPr>
+          <a:lstStyle/>
+          <a:p>
+            <a:r>
+              <a:rPr lang="en-US" dirty="0" smtClean="0"/>
+              <a:t>When an individual is covered by multiple insurance policies, one policy is deemed the primary coverage.</a:t>
+            </a:r>
+          </a:p>
+          <a:p>
+            <a:r>
+              <a:rPr lang="en-US" dirty="0" smtClean="0"/>
+              <a:t>The primary coverage policy makes the first payment towards the claims.</a:t>
+            </a:r>
+          </a:p>
+          <a:p>
+            <a:r>
+              <a:rPr lang="en-US" dirty="0" smtClean="0"/>
+              <a:t>If the primary coverage only pays part of the claim, the other coverage can pay the unpaid balance.  </a:t>
+            </a:r>
+            <a:r>
+              <a:rPr lang="en-US" dirty="0" smtClean="0"/>
+              <a:t>That second policy is known as the secondary coverage.</a:t>
+            </a:r>
+          </a:p>
+          <a:p>
+            <a:r>
+              <a:rPr lang="en-US" dirty="0" smtClean="0"/>
+              <a:t>This can occur when:</a:t>
+            </a:r>
+          </a:p>
+          <a:p>
+            <a:pPr lvl="1"/>
+            <a:r>
+              <a:rPr lang="en-US" dirty="0" smtClean="0"/>
+              <a:t>An individual has both commercial and Medicare coverage</a:t>
+            </a:r>
+          </a:p>
+          <a:p>
+            <a:pPr lvl="1"/>
+            <a:r>
+              <a:rPr lang="en-US" dirty="0" smtClean="0"/>
+              <a:t>A young adult has their own coverage and coverage from their parents</a:t>
+            </a:r>
+          </a:p>
+          <a:p>
+            <a:pPr lvl="1"/>
+            <a:r>
+              <a:rPr lang="en-US" dirty="0" smtClean="0"/>
+              <a:t>An individual has their own coverage and coverage from their spouse</a:t>
+            </a:r>
+          </a:p>
           <a:p>
             <a:endParaRPr lang="en-US" dirty="0"/>
           </a:p>
@@ -6916,7 +7017,11 @@
           <a:bodyPr/>
           <a:lstStyle/>
           <a:p>
-            <a:endParaRPr lang="en-US"/>
+            <a:r>
+              <a:rPr lang="en-US" dirty="0" smtClean="0"/>
+              <a:t>Market Category Code</a:t>
+            </a:r>
+            <a:endParaRPr lang="en-US" dirty="0"/>
           </a:p>
         </p:txBody>
       </p:sp>
@@ -6930,11 +7035,84 @@
             <p:ph idx="1"/>
           </p:nvPr>
         </p:nvSpPr>
-        <p:spPr/>
-        <p:txBody>
-          <a:bodyPr/>
-          <a:lstStyle/>
-          <a:p>
+        <p:spPr>
+          <a:xfrm>
+            <a:off x="1534696" y="2015732"/>
+            <a:ext cx="9520158" cy="4272052"/>
+          </a:xfrm>
+        </p:spPr>
+        <p:txBody>
+          <a:bodyPr/>
+          <a:lstStyle/>
+          <a:p>
+            <a:r>
+              <a:rPr lang="en-US" dirty="0" smtClean="0"/>
+              <a:t>Provides details about the size of the employer that purchased the insurance policy:</a:t>
+            </a:r>
+          </a:p>
+          <a:p>
+            <a:pPr lvl="1"/>
+            <a:r>
+              <a:rPr lang="en-US" dirty="0" smtClean="0"/>
+              <a:t>Individual without a company</a:t>
+            </a:r>
+          </a:p>
+          <a:p>
+            <a:pPr lvl="1"/>
+            <a:r>
+              <a:rPr lang="en-US" dirty="0" smtClean="0"/>
+              <a:t>Sole Proprietor with exactly one employee</a:t>
+            </a:r>
+          </a:p>
+          <a:p>
+            <a:pPr lvl="1"/>
+            <a:r>
+              <a:rPr lang="en-US" dirty="0" smtClean="0"/>
+              <a:t>2-9 employees</a:t>
+            </a:r>
+          </a:p>
+          <a:p>
+            <a:pPr lvl="1"/>
+            <a:r>
+              <a:rPr lang="en-US" dirty="0" smtClean="0"/>
+              <a:t>10-25 employees</a:t>
+            </a:r>
+          </a:p>
+          <a:p>
+            <a:pPr lvl="1"/>
+            <a:r>
+              <a:rPr lang="en-US" dirty="0" smtClean="0"/>
+              <a:t>51-100 employees</a:t>
+            </a:r>
+          </a:p>
+          <a:p>
+            <a:pPr lvl="1"/>
+            <a:r>
+              <a:rPr lang="en-US" dirty="0" smtClean="0"/>
+              <a:t>101-250 employees</a:t>
+            </a:r>
+          </a:p>
+          <a:p>
+            <a:pPr lvl="1"/>
+            <a:r>
+              <a:rPr lang="en-US" dirty="0" smtClean="0"/>
+              <a:t>251-500 employees</a:t>
+            </a:r>
+          </a:p>
+          <a:p>
+            <a:pPr lvl="1"/>
+            <a:r>
+              <a:rPr lang="en-US" dirty="0" smtClean="0"/>
+              <a:t>More than 500 </a:t>
+            </a:r>
+            <a:r>
+              <a:rPr lang="en-US" dirty="0"/>
+              <a:t>employees</a:t>
+            </a:r>
+            <a:endParaRPr lang="en-US" dirty="0" smtClean="0"/>
+          </a:p>
+          <a:p>
+            <a:pPr lvl="1"/>
             <a:endParaRPr lang="en-US" dirty="0"/>
           </a:p>
         </p:txBody>
@@ -6984,7 +7162,11 @@
           <a:bodyPr/>
           <a:lstStyle/>
           <a:p>
-            <a:endParaRPr lang="en-US"/>
+            <a:r>
+              <a:rPr lang="en-US" dirty="0" smtClean="0"/>
+              <a:t>References</a:t>
+            </a:r>
+            <a:endParaRPr lang="en-US" dirty="0"/>
           </a:p>
         </p:txBody>
       </p:sp>
@@ -7003,73 +7185,20 @@
           <a:bodyPr/>
           <a:lstStyle/>
           <a:p>
-            <a:endParaRPr lang="en-US" dirty="0"/>
-          </a:p>
-        </p:txBody>
-      </p:sp>
-    </p:spTree>
-    <p:extLst>
-      <p:ext uri="{BB962C8B-B14F-4D97-AF65-F5344CB8AC3E}">
-        <p14:creationId xmlns:p14="http://schemas.microsoft.com/office/powerpoint/2010/main" val="1243835761"/>
-      </p:ext>
-    </p:extLst>
-  </p:cSld>
-  <p:clrMapOvr>
-    <a:masterClrMapping/>
-  </p:clrMapOvr>
-</p:sld>
-</file>
-
-<file path=ppt/slides/slide7.xml><?xml version="1.0" encoding="utf-8"?>
-<p:sld xmlns:a="http://schemas.openxmlformats.org/drawingml/2006/main" xmlns:r="http://schemas.openxmlformats.org/officeDocument/2006/relationships" xmlns:p="http://schemas.openxmlformats.org/presentationml/2006/main">
-  <p:cSld>
-    <p:spTree>
-      <p:nvGrpSpPr>
-        <p:cNvPr id="1" name=""/>
-        <p:cNvGrpSpPr/>
-        <p:nvPr/>
-      </p:nvGrpSpPr>
-      <p:grpSpPr>
-        <a:xfrm>
-          <a:off x="0" y="0"/>
-          <a:ext cx="0" cy="0"/>
-          <a:chOff x="0" y="0"/>
-          <a:chExt cx="0" cy="0"/>
-        </a:xfrm>
-      </p:grpSpPr>
-      <p:sp>
-        <p:nvSpPr>
-          <p:cNvPr id="2" name="Title 1"/>
-          <p:cNvSpPr>
-            <a:spLocks noGrp="1"/>
-          </p:cNvSpPr>
-          <p:nvPr>
-            <p:ph type="title"/>
-          </p:nvPr>
-        </p:nvSpPr>
-        <p:spPr/>
-        <p:txBody>
-          <a:bodyPr/>
-          <a:lstStyle/>
-          <a:p>
-            <a:endParaRPr lang="en-US"/>
-          </a:p>
-        </p:txBody>
-      </p:sp>
-      <p:sp>
-        <p:nvSpPr>
-          <p:cNvPr id="3" name="Content Placeholder 2"/>
-          <p:cNvSpPr>
-            <a:spLocks noGrp="1"/>
-          </p:cNvSpPr>
-          <p:nvPr>
-            <p:ph idx="1"/>
-          </p:nvPr>
-        </p:nvSpPr>
-        <p:spPr/>
-        <p:txBody>
-          <a:bodyPr/>
-          <a:lstStyle/>
+            <a:r>
+              <a:rPr lang="en-US" dirty="0">
+                <a:hlinkClick r:id="rId2"/>
+              </a:rPr>
+              <a:t>http://</a:t>
+            </a:r>
+            <a:r>
+              <a:rPr lang="en-US" dirty="0" smtClean="0">
+                <a:hlinkClick r:id="rId2"/>
+              </a:rPr>
+              <a:t>www.chiamass.gov/assets/docs/p/apcd/submission-guides/version-5.0/v5-apcd-member-eligibility-file-submission-guide-FINAL.pdf</a:t>
+            </a:r>
+            <a:endParaRPr lang="en-US" dirty="0" smtClean="0"/>
+          </a:p>
           <a:p>
             <a:endParaRPr lang="en-US" dirty="0"/>
           </a:p>
@@ -7588,7 +7717,7 @@
   <a:extraClrSchemeLst/>
   <a:extLst>
     <a:ext uri="{05A4C25C-085E-4340-85A3-A5531E510DB2}">
-      <thm15:themeFamily xmlns:thm15="http://schemas.microsoft.com/office/thememl/2012/main" xmlns="" name="Gallery" id="{BBFCD31E-59A1-489D-B089-A3EAD7CAE12E}" vid="{AC464412-510E-4F2B-8947-A0DDBD028997}"/>
+      <thm15:themeFamily xmlns="" xmlns:thm15="http://schemas.microsoft.com/office/thememl/2012/main" name="Gallery" id="{BBFCD31E-59A1-489D-B089-A3EAD7CAE12E}" vid="{AC464412-510E-4F2B-8947-A0DDBD028997}"/>
     </a:ext>
   </a:extLst>
 </a:theme>

</xml_diff>

<commit_message>
reformated video titles on the webpage
</commit_message>
<xml_diff>
--- a/PowerPoints/Phase 4 - Insurance Terminology/020 Different Types of Commercial Insurance.pptx
+++ b/PowerPoints/Phase 4 - Insurance Terminology/020 Different Types of Commercial Insurance.pptx
@@ -255,7 +255,7 @@
           <a:p>
             <a:fld id="{FF632088-7E42-4B13-8645-6CA4616862AF}" type="datetimeFigureOut">
               <a:rPr lang="en-US" smtClean="0"/>
-              <a:t>3/1/2016</a:t>
+              <a:t>3/2/2016</a:t>
             </a:fld>
             <a:endParaRPr lang="en-US"/>
           </a:p>
@@ -425,7 +425,7 @@
           <a:p>
             <a:fld id="{FF632088-7E42-4B13-8645-6CA4616862AF}" type="datetimeFigureOut">
               <a:rPr lang="en-US" smtClean="0"/>
-              <a:t>3/1/2016</a:t>
+              <a:t>3/2/2016</a:t>
             </a:fld>
             <a:endParaRPr lang="en-US"/>
           </a:p>
@@ -605,7 +605,7 @@
           <a:p>
             <a:fld id="{FF632088-7E42-4B13-8645-6CA4616862AF}" type="datetimeFigureOut">
               <a:rPr lang="en-US" smtClean="0"/>
-              <a:t>3/1/2016</a:t>
+              <a:t>3/2/2016</a:t>
             </a:fld>
             <a:endParaRPr lang="en-US"/>
           </a:p>
@@ -805,7 +805,7 @@
           <a:p>
             <a:fld id="{FF632088-7E42-4B13-8645-6CA4616862AF}" type="datetimeFigureOut">
               <a:rPr lang="en-US" smtClean="0"/>
-              <a:t>3/1/2016</a:t>
+              <a:t>3/2/2016</a:t>
             </a:fld>
             <a:endParaRPr lang="en-US"/>
           </a:p>
@@ -1022,7 +1022,7 @@
           <a:p>
             <a:fld id="{FF632088-7E42-4B13-8645-6CA4616862AF}" type="datetimeFigureOut">
               <a:rPr lang="en-US" smtClean="0"/>
-              <a:t>3/1/2016</a:t>
+              <a:t>3/2/2016</a:t>
             </a:fld>
             <a:endParaRPr lang="en-US"/>
           </a:p>
@@ -1307,7 +1307,7 @@
           <a:p>
             <a:fld id="{FF632088-7E42-4B13-8645-6CA4616862AF}" type="datetimeFigureOut">
               <a:rPr lang="en-US" smtClean="0"/>
-              <a:t>3/1/2016</a:t>
+              <a:t>3/2/2016</a:t>
             </a:fld>
             <a:endParaRPr lang="en-US"/>
           </a:p>
@@ -1581,7 +1581,7 @@
           <a:p>
             <a:fld id="{FF632088-7E42-4B13-8645-6CA4616862AF}" type="datetimeFigureOut">
               <a:rPr lang="en-US" smtClean="0"/>
-              <a:t>3/1/2016</a:t>
+              <a:t>3/2/2016</a:t>
             </a:fld>
             <a:endParaRPr lang="en-US"/>
           </a:p>
@@ -1678,7 +1678,7 @@
   </p:clrMapOvr>
   <p:extLst>
     <p:ext uri="{DCECCB84-F9BA-43D5-87BE-67443E8EF086}">
-      <p15:sldGuideLst xmlns="" xmlns:p15="http://schemas.microsoft.com/office/powerpoint/2012/main"/>
+      <p15:sldGuideLst xmlns:p15="http://schemas.microsoft.com/office/powerpoint/2012/main" xmlns=""/>
     </p:ext>
   </p:extLst>
 </p:sldLayout>
@@ -2008,7 +2008,7 @@
           <a:p>
             <a:fld id="{FF632088-7E42-4B13-8645-6CA4616862AF}" type="datetimeFigureOut">
               <a:rPr lang="en-US" smtClean="0"/>
-              <a:t>3/1/2016</a:t>
+              <a:t>3/2/2016</a:t>
             </a:fld>
             <a:endParaRPr lang="en-US"/>
           </a:p>
@@ -2105,7 +2105,7 @@
   </p:clrMapOvr>
   <p:extLst>
     <p:ext uri="{DCECCB84-F9BA-43D5-87BE-67443E8EF086}">
-      <p15:sldGuideLst xmlns="" xmlns:p15="http://schemas.microsoft.com/office/powerpoint/2012/main"/>
+      <p15:sldGuideLst xmlns:p15="http://schemas.microsoft.com/office/powerpoint/2012/main" xmlns=""/>
     </p:ext>
   </p:extLst>
 </p:sldLayout>
@@ -2168,7 +2168,7 @@
           <a:p>
             <a:fld id="{FF632088-7E42-4B13-8645-6CA4616862AF}" type="datetimeFigureOut">
               <a:rPr lang="en-US" smtClean="0"/>
-              <a:t>3/1/2016</a:t>
+              <a:t>3/2/2016</a:t>
             </a:fld>
             <a:endParaRPr lang="en-US"/>
           </a:p>
@@ -2300,7 +2300,7 @@
           <a:p>
             <a:fld id="{FF632088-7E42-4B13-8645-6CA4616862AF}" type="datetimeFigureOut">
               <a:rPr lang="en-US" smtClean="0"/>
-              <a:t>3/1/2016</a:t>
+              <a:t>3/2/2016</a:t>
             </a:fld>
             <a:endParaRPr lang="en-US"/>
           </a:p>
@@ -2551,7 +2551,7 @@
           <a:p>
             <a:fld id="{FF632088-7E42-4B13-8645-6CA4616862AF}" type="datetimeFigureOut">
               <a:rPr lang="en-US" smtClean="0"/>
-              <a:t>3/1/2016</a:t>
+              <a:t>3/2/2016</a:t>
             </a:fld>
             <a:endParaRPr lang="en-US"/>
           </a:p>
@@ -2648,7 +2648,7 @@
   </p:clrMapOvr>
   <p:extLst>
     <p:ext uri="{DCECCB84-F9BA-43D5-87BE-67443E8EF086}">
-      <p15:sldGuideLst xmlns="" xmlns:p15="http://schemas.microsoft.com/office/powerpoint/2012/main"/>
+      <p15:sldGuideLst xmlns:p15="http://schemas.microsoft.com/office/powerpoint/2012/main" xmlns=""/>
     </p:ext>
   </p:extLst>
 </p:sldLayout>
@@ -2763,7 +2763,7 @@
           <a:p>
             <a:fld id="{FF632088-7E42-4B13-8645-6CA4616862AF}" type="datetimeFigureOut">
               <a:rPr lang="en-US" smtClean="0"/>
-              <a:t>3/1/2016</a:t>
+              <a:t>3/2/2016</a:t>
             </a:fld>
             <a:endParaRPr lang="en-US"/>
           </a:p>
@@ -3181,7 +3181,7 @@
           <a:p>
             <a:fld id="{FF632088-7E42-4B13-8645-6CA4616862AF}" type="datetimeFigureOut">
               <a:rPr lang="en-US" smtClean="0"/>
-              <a:t>3/1/2016</a:t>
+              <a:t>3/2/2016</a:t>
             </a:fld>
             <a:endParaRPr lang="en-US"/>
           </a:p>
@@ -3393,7 +3393,7 @@
           <a:p>
             <a:fld id="{FF632088-7E42-4B13-8645-6CA4616862AF}" type="datetimeFigureOut">
               <a:rPr lang="en-US" smtClean="0"/>
-              <a:t>3/1/2016</a:t>
+              <a:t>3/2/2016</a:t>
             </a:fld>
             <a:endParaRPr lang="en-US"/>
           </a:p>
@@ -3614,7 +3614,7 @@
           <a:p>
             <a:fld id="{FF632088-7E42-4B13-8645-6CA4616862AF}" type="datetimeFigureOut">
               <a:rPr lang="en-US" smtClean="0"/>
-              <a:t>3/1/2016</a:t>
+              <a:t>3/2/2016</a:t>
             </a:fld>
             <a:endParaRPr lang="en-US"/>
           </a:p>
@@ -3902,7 +3902,7 @@
           <a:p>
             <a:fld id="{FF632088-7E42-4B13-8645-6CA4616862AF}" type="datetimeFigureOut">
               <a:rPr lang="en-US" smtClean="0"/>
-              <a:t>3/1/2016</a:t>
+              <a:t>3/2/2016</a:t>
             </a:fld>
             <a:endParaRPr lang="en-US"/>
           </a:p>
@@ -4134,7 +4134,7 @@
           <a:p>
             <a:fld id="{FF632088-7E42-4B13-8645-6CA4616862AF}" type="datetimeFigureOut">
               <a:rPr lang="en-US" smtClean="0"/>
-              <a:t>3/1/2016</a:t>
+              <a:t>3/2/2016</a:t>
             </a:fld>
             <a:endParaRPr lang="en-US"/>
           </a:p>
@@ -4194,7 +4194,7 @@
   </p:clrMapOvr>
   <p:extLst>
     <p:ext uri="{DCECCB84-F9BA-43D5-87BE-67443E8EF086}">
-      <p15:sldGuideLst xmlns="" xmlns:p15="http://schemas.microsoft.com/office/powerpoint/2012/main"/>
+      <p15:sldGuideLst xmlns:p15="http://schemas.microsoft.com/office/powerpoint/2012/main" xmlns=""/>
     </p:ext>
   </p:extLst>
 </p:sldLayout>
@@ -4486,7 +4486,7 @@
           <a:p>
             <a:fld id="{FF632088-7E42-4B13-8645-6CA4616862AF}" type="datetimeFigureOut">
               <a:rPr lang="en-US" smtClean="0"/>
-              <a:t>3/1/2016</a:t>
+              <a:t>3/2/2016</a:t>
             </a:fld>
             <a:endParaRPr lang="en-US"/>
           </a:p>
@@ -4569,7 +4569,7 @@
   </p:clrMapOvr>
   <p:extLst>
     <p:ext uri="{DCECCB84-F9BA-43D5-87BE-67443E8EF086}">
-      <p15:sldGuideLst xmlns="" xmlns:p15="http://schemas.microsoft.com/office/powerpoint/2012/main"/>
+      <p15:sldGuideLst xmlns:p15="http://schemas.microsoft.com/office/powerpoint/2012/main" xmlns=""/>
     </p:ext>
   </p:extLst>
 </p:sldLayout>
@@ -4609,7 +4609,7 @@
           <a:p>
             <a:fld id="{FF632088-7E42-4B13-8645-6CA4616862AF}" type="datetimeFigureOut">
               <a:rPr lang="en-US" smtClean="0"/>
-              <a:t>3/1/2016</a:t>
+              <a:t>3/2/2016</a:t>
             </a:fld>
             <a:endParaRPr lang="en-US"/>
           </a:p>
@@ -4727,7 +4727,7 @@
           <a:p>
             <a:fld id="{FF632088-7E42-4B13-8645-6CA4616862AF}" type="datetimeFigureOut">
               <a:rPr lang="en-US" smtClean="0"/>
-              <a:t>3/1/2016</a:t>
+              <a:t>3/2/2016</a:t>
             </a:fld>
             <a:endParaRPr lang="en-US"/>
           </a:p>
@@ -5011,7 +5011,7 @@
           <a:p>
             <a:fld id="{FF632088-7E42-4B13-8645-6CA4616862AF}" type="datetimeFigureOut">
               <a:rPr lang="en-US" smtClean="0"/>
-              <a:t>3/1/2016</a:t>
+              <a:t>3/2/2016</a:t>
             </a:fld>
             <a:endParaRPr lang="en-US"/>
           </a:p>
@@ -5071,7 +5071,7 @@
   </p:clrMapOvr>
   <p:extLst>
     <p:ext uri="{DCECCB84-F9BA-43D5-87BE-67443E8EF086}">
-      <p15:sldGuideLst xmlns="" xmlns:p15="http://schemas.microsoft.com/office/powerpoint/2012/main"/>
+      <p15:sldGuideLst xmlns:p15="http://schemas.microsoft.com/office/powerpoint/2012/main" xmlns=""/>
     </p:ext>
   </p:extLst>
 </p:sldLayout>
@@ -5280,7 +5280,7 @@
           <a:p>
             <a:fld id="{FF632088-7E42-4B13-8645-6CA4616862AF}" type="datetimeFigureOut">
               <a:rPr lang="en-US" smtClean="0"/>
-              <a:t>3/1/2016</a:t>
+              <a:t>3/2/2016</a:t>
             </a:fld>
             <a:endParaRPr lang="en-US"/>
           </a:p>
@@ -5494,7 +5494,7 @@
           <a:p>
             <a:fld id="{FF632088-7E42-4B13-8645-6CA4616862AF}" type="datetimeFigureOut">
               <a:rPr lang="en-US" smtClean="0"/>
-              <a:t>3/1/2016</a:t>
+              <a:t>3/2/2016</a:t>
             </a:fld>
             <a:endParaRPr lang="en-US"/>
           </a:p>
@@ -5870,7 +5870,7 @@
   </p:txStyles>
   <p:extLst>
     <p:ext uri="{27BBF7A9-308A-43DC-89C8-2F10F3537804}">
-      <p15:sldGuideLst xmlns="" xmlns:p15="http://schemas.microsoft.com/office/powerpoint/2012/main"/>
+      <p15:sldGuideLst xmlns:p15="http://schemas.microsoft.com/office/powerpoint/2012/main" xmlns=""/>
     </p:ext>
   </p:extLst>
 </p:sldMaster>
@@ -6099,7 +6099,7 @@
           <a:p>
             <a:fld id="{FF632088-7E42-4B13-8645-6CA4616862AF}" type="datetimeFigureOut">
               <a:rPr lang="en-US" smtClean="0"/>
-              <a:t>3/1/2016</a:t>
+              <a:t>3/2/2016</a:t>
             </a:fld>
             <a:endParaRPr lang="en-US"/>
           </a:p>
@@ -6567,7 +6567,7 @@
   </p:txStyles>
   <p:extLst>
     <p:ext uri="{27BBF7A9-308A-43DC-89C8-2F10F3537804}">
-      <p15:sldGuideLst xmlns="" xmlns:p15="http://schemas.microsoft.com/office/powerpoint/2012/main"/>
+      <p15:sldGuideLst xmlns:p15="http://schemas.microsoft.com/office/powerpoint/2012/main" xmlns=""/>
     </p:ext>
   </p:extLst>
 </p:sldMaster>
@@ -6612,16 +6612,12 @@
               <a:t>Types of </a:t>
             </a:r>
             <a:r>
-              <a:rPr lang="en-US" dirty="0" err="1" smtClean="0"/>
-              <a:t>Commerical</a:t>
-            </a:r>
-            <a:r>
-              <a:rPr lang="en-US" smtClean="0"/>
-              <a:t> Health </a:t>
-            </a:r>
-            <a:r>
               <a:rPr lang="en-US" dirty="0" smtClean="0"/>
-              <a:t>Insurance</a:t>
+              <a:t>Commercial </a:t>
+            </a:r>
+            <a:r>
+              <a:rPr lang="en-US" dirty="0" smtClean="0"/>
+              <a:t>Health Insurance</a:t>
             </a:r>
             <a:endParaRPr lang="en-US" dirty="0"/>
           </a:p>
@@ -6752,7 +6748,6 @@
               <a:rPr lang="en-US" dirty="0" smtClean="0"/>
               <a:t>Worker’s Compensation</a:t>
             </a:r>
-            <a:endParaRPr lang="en-US" dirty="0" smtClean="0"/>
           </a:p>
         </p:txBody>
       </p:sp>
@@ -6933,11 +6928,7 @@
           <a:p>
             <a:r>
               <a:rPr lang="en-US" dirty="0" smtClean="0"/>
-              <a:t>If the primary coverage only pays part of the claim, the other coverage can pay the unpaid balance.  </a:t>
-            </a:r>
-            <a:r>
-              <a:rPr lang="en-US" dirty="0" smtClean="0"/>
-              <a:t>That second policy is known as the secondary coverage.</a:t>
+              <a:t>If the primary coverage only pays part of the claim, the other coverage can pay the unpaid balance.  That second policy is known as the secondary coverage.</a:t>
             </a:r>
           </a:p>
           <a:p>
@@ -7717,7 +7708,7 @@
   <a:extraClrSchemeLst/>
   <a:extLst>
     <a:ext uri="{05A4C25C-085E-4340-85A3-A5531E510DB2}">
-      <thm15:themeFamily xmlns="" xmlns:thm15="http://schemas.microsoft.com/office/thememl/2012/main" name="Gallery" id="{BBFCD31E-59A1-489D-B089-A3EAD7CAE12E}" vid="{AC464412-510E-4F2B-8947-A0DDBD028997}"/>
+      <thm15:themeFamily xmlns:thm15="http://schemas.microsoft.com/office/thememl/2012/main" xmlns="" name="Gallery" id="{BBFCD31E-59A1-489D-B089-A3EAD7CAE12E}" vid="{AC464412-510E-4F2B-8947-A0DDBD028997}"/>
     </a:ext>
   </a:extLst>
 </a:theme>

</xml_diff>